<commit_message>
ENG SOFWTARE ajustes 12/09/2024 2024.2
</commit_message>
<xml_diff>
--- a/01 Classes/Aulas 03 e 04 Conceitos Métodos Ágeis XP e Analise OO.pptx
+++ b/01 Classes/Aulas 03 e 04 Conceitos Métodos Ágeis XP e Analise OO.pptx
@@ -11529,7 +11529,7 @@
             </a:r>
             <a:r>
               <a:rPr lang="pt-PT" altLang="pt-BR" b="1" dirty="0"/>
-              <a:t>Diagramas de Classes (</a:t>
+              <a:t>Diagrama de Classe (</a:t>
             </a:r>
             <a:r>
               <a:rPr lang="pt-PT" altLang="pt-BR" b="1" dirty="0">
@@ -11559,7 +11559,7 @@
             </a:pPr>
             <a:r>
               <a:rPr lang="pt-PT" altLang="pt-BR" dirty="0"/>
-              <a:t>Classes, representação de um item do mundo real.</a:t>
+              <a:t>Classe, representação de um item do mundo real.</a:t>
             </a:r>
           </a:p>
           <a:p>
@@ -12776,7 +12776,7 @@
             </a:r>
             <a:r>
               <a:rPr lang="pt-PT" altLang="pt-BR" b="1" dirty="0"/>
-              <a:t>Diagramas de Classes (</a:t>
+              <a:t>Diagrama de Classe (</a:t>
             </a:r>
             <a:r>
               <a:rPr lang="pt-PT" altLang="pt-BR" b="1" dirty="0">
@@ -13596,7 +13596,7 @@
             </a:r>
             <a:r>
               <a:rPr lang="pt-PT" altLang="pt-BR" b="1" dirty="0"/>
-              <a:t>Diagramas de Classes (</a:t>
+              <a:t>Diagrama de Classe (</a:t>
             </a:r>
             <a:r>
               <a:rPr lang="pt-PT" altLang="pt-BR" b="1" dirty="0">
@@ -13658,7 +13658,7 @@
                   <a:srgbClr val="FF0000"/>
                 </a:solidFill>
               </a:rPr>
-              <a:t>Relacionamentos entre as Classes (conexões)</a:t>
+              <a:t>Associação entre Classes (conexão) - Relacionamentos</a:t>
             </a:r>
             <a:endParaRPr lang="pt-PT" dirty="0"/>
           </a:p>
@@ -14671,7 +14671,7 @@
         <p:spPr>
           <a:xfrm>
             <a:off x="400355" y="1373887"/>
-            <a:ext cx="8572500" cy="4978565"/>
+            <a:ext cx="8572500" cy="5209475"/>
           </a:xfrm>
           <a:prstGeom prst="rect">
             <a:avLst/>
@@ -14949,7 +14949,7 @@
             </a:r>
             <a:r>
               <a:rPr lang="pt-PT" altLang="pt-BR" b="1" dirty="0"/>
-              <a:t>Diagramas de Classes (</a:t>
+              <a:t>Diagramas de Classe (</a:t>
             </a:r>
             <a:r>
               <a:rPr lang="pt-PT" altLang="pt-BR" b="1" dirty="0">
@@ -14957,7 +14957,7 @@
                   <a:srgbClr val="FF0000"/>
                 </a:solidFill>
               </a:rPr>
-              <a:t>Cardinalidade</a:t>
+              <a:t>Multiplicidade</a:t>
             </a:r>
             <a:r>
               <a:rPr lang="pt-PT" altLang="pt-BR" b="1" dirty="0"/>
@@ -16385,7 +16385,7 @@
             </a:r>
             <a:r>
               <a:rPr lang="pt-PT" altLang="pt-BR" b="1" dirty="0"/>
-              <a:t>Diagramas de Classes (</a:t>
+              <a:t>Diagrama de Classe (</a:t>
             </a:r>
             <a:r>
               <a:rPr lang="pt-PT" altLang="pt-BR" b="1" dirty="0">
@@ -16393,7 +16393,7 @@
                   <a:srgbClr val="FF0000"/>
                 </a:solidFill>
               </a:rPr>
-              <a:t>Relacionamentos</a:t>
+              <a:t>Associação</a:t>
             </a:r>
             <a:r>
               <a:rPr lang="pt-PT" altLang="pt-BR" b="1" dirty="0"/>
@@ -18446,12 +18446,16 @@
               <a:buNone/>
             </a:pPr>
             <a:r>
-              <a:rPr lang="pt-PT" altLang="pt-BR" dirty="0"/>
+              <a:rPr lang="pt-PT" altLang="pt-BR"/>
               <a:t>	</a:t>
             </a:r>
             <a:r>
+              <a:rPr lang="pt-PT" altLang="pt-BR" b="1"/>
+              <a:t>Diagrama de Classe </a:t>
+            </a:r>
+            <a:r>
               <a:rPr lang="pt-PT" altLang="pt-BR" b="1" dirty="0"/>
-              <a:t>Diagramas de Classes (</a:t>
+              <a:t>(</a:t>
             </a:r>
             <a:r>
               <a:rPr lang="pt-PT" altLang="pt-BR" b="1" dirty="0">
@@ -18459,7 +18463,7 @@
                   <a:srgbClr val="FF0000"/>
                 </a:solidFill>
               </a:rPr>
-              <a:t>Relacionamentos</a:t>
+              <a:t>Associação</a:t>
             </a:r>
             <a:r>
               <a:rPr lang="pt-PT" altLang="pt-BR" b="1" dirty="0"/>

</xml_diff>